<commit_message>
Fixed a few issues
</commit_message>
<xml_diff>
--- a/Object-Oriented Programming.pptx
+++ b/Object-Oriented Programming.pptx
@@ -245,7 +245,7 @@
           <a:p>
             <a:fld id="{D1C2B841-7D93-490C-A5ED-82F271D21774}" type="datetimeFigureOut">
               <a:rPr lang="en-GB" smtClean="0"/>
-              <a:t>08/01/17</a:t>
+              <a:t>09/01/17</a:t>
             </a:fld>
             <a:endParaRPr lang="en-GB"/>
           </a:p>
@@ -1017,7 +1017,7 @@
           <a:p>
             <a:fld id="{B39D0E86-E08E-4A99-A3F1-6C1F9DF9C5E3}" type="datetimeFigureOut">
               <a:rPr lang="en-GB" smtClean="0"/>
-              <a:t>08/01/17</a:t>
+              <a:t>09/01/17</a:t>
             </a:fld>
             <a:endParaRPr lang="en-GB" dirty="0"/>
           </a:p>
@@ -1218,7 +1218,7 @@
           <a:p>
             <a:fld id="{B39D0E86-E08E-4A99-A3F1-6C1F9DF9C5E3}" type="datetimeFigureOut">
               <a:rPr lang="en-GB" smtClean="0"/>
-              <a:t>08/01/17</a:t>
+              <a:t>09/01/17</a:t>
             </a:fld>
             <a:endParaRPr lang="en-GB" dirty="0"/>
           </a:p>
@@ -1408,7 +1408,7 @@
           <a:p>
             <a:fld id="{B39D0E86-E08E-4A99-A3F1-6C1F9DF9C5E3}" type="datetimeFigureOut">
               <a:rPr lang="en-GB" smtClean="0"/>
-              <a:t>08/01/17</a:t>
+              <a:t>09/01/17</a:t>
             </a:fld>
             <a:endParaRPr lang="en-GB" dirty="0"/>
           </a:p>
@@ -1874,7 +1874,7 @@
           <a:p>
             <a:fld id="{B39D0E86-E08E-4A99-A3F1-6C1F9DF9C5E3}" type="datetimeFigureOut">
               <a:rPr lang="en-GB" smtClean="0"/>
-              <a:t>08/01/17</a:t>
+              <a:t>09/01/17</a:t>
             </a:fld>
             <a:endParaRPr lang="en-GB" dirty="0"/>
           </a:p>
@@ -3106,7 +3106,7 @@
           <a:p>
             <a:fld id="{B39D0E86-E08E-4A99-A3F1-6C1F9DF9C5E3}" type="datetimeFigureOut">
               <a:rPr lang="en-GB" smtClean="0"/>
-              <a:t>08/01/17</a:t>
+              <a:t>09/01/17</a:t>
             </a:fld>
             <a:endParaRPr lang="en-GB" dirty="0"/>
           </a:p>
@@ -3376,7 +3376,7 @@
           <a:p>
             <a:fld id="{B39D0E86-E08E-4A99-A3F1-6C1F9DF9C5E3}" type="datetimeFigureOut">
               <a:rPr lang="en-GB" smtClean="0"/>
-              <a:t>08/01/17</a:t>
+              <a:t>09/01/17</a:t>
             </a:fld>
             <a:endParaRPr lang="en-GB" dirty="0"/>
           </a:p>
@@ -3622,7 +3622,7 @@
           <a:p>
             <a:fld id="{B39D0E86-E08E-4A99-A3F1-6C1F9DF9C5E3}" type="datetimeFigureOut">
               <a:rPr lang="en-GB" smtClean="0"/>
-              <a:t>08/01/17</a:t>
+              <a:t>09/01/17</a:t>
             </a:fld>
             <a:endParaRPr lang="en-GB" dirty="0"/>
           </a:p>
@@ -5799,7 +5799,7 @@
         <p:spPr>
           <a:xfrm>
             <a:off x="287386" y="771531"/>
-            <a:ext cx="8584473" cy="6370975"/>
+            <a:ext cx="8584473" cy="7078861"/>
           </a:xfrm>
           <a:prstGeom prst="rect">
             <a:avLst/>
@@ -5825,7 +5825,7 @@
             </a:endParaRPr>
           </a:p>
           <a:p>
-            <a:endParaRPr lang="en-GB" sz="1200" dirty="0">
+            <a:endParaRPr lang="en-GB" sz="1400" dirty="0">
               <a:solidFill>
                 <a:srgbClr val="00B050"/>
               </a:solidFill>
@@ -5835,7 +5835,7 @@
           </a:p>
           <a:p>
             <a:r>
-              <a:rPr lang="en-GB" sz="1200" dirty="0">
+              <a:rPr lang="en-GB" sz="1400" dirty="0">
                 <a:solidFill>
                   <a:srgbClr val="00B050"/>
                 </a:solidFill>
@@ -5847,28 +5847,28 @@
           </a:p>
           <a:p>
             <a:r>
-              <a:rPr lang="en-GB" sz="1200" dirty="0" err="1">
+              <a:rPr lang="en-GB" sz="1400" dirty="0" err="1">
                 <a:latin typeface="Courier New" panose="02070309020205020404" pitchFamily="49" charset="0"/>
                 <a:cs typeface="Courier New" panose="02070309020205020404" pitchFamily="49" charset="0"/>
               </a:rPr>
               <a:t>entered_name</a:t>
             </a:r>
             <a:r>
-              <a:rPr lang="en-GB" sz="1200" dirty="0">
+              <a:rPr lang="en-GB" sz="1400" dirty="0">
                 <a:latin typeface="Courier New" panose="02070309020205020404" pitchFamily="49" charset="0"/>
                 <a:cs typeface="Courier New" panose="02070309020205020404" pitchFamily="49" charset="0"/>
               </a:rPr>
               <a:t> = </a:t>
             </a:r>
             <a:r>
-              <a:rPr lang="en-GB" sz="1200" dirty="0" err="1">
+              <a:rPr lang="en-GB" sz="1400" dirty="0" err="1">
                 <a:latin typeface="Courier New" panose="02070309020205020404" pitchFamily="49" charset="0"/>
                 <a:cs typeface="Courier New" panose="02070309020205020404" pitchFamily="49" charset="0"/>
               </a:rPr>
               <a:t>ask_for_name</a:t>
             </a:r>
             <a:r>
-              <a:rPr lang="en-GB" sz="1200" dirty="0">
+              <a:rPr lang="en-GB" sz="1400" dirty="0">
                 <a:latin typeface="Courier New" panose="02070309020205020404" pitchFamily="49" charset="0"/>
                 <a:cs typeface="Courier New" panose="02070309020205020404" pitchFamily="49" charset="0"/>
               </a:rPr>
@@ -5877,28 +5877,28 @@
           </a:p>
           <a:p>
             <a:r>
-              <a:rPr lang="en-GB" sz="1200" dirty="0" err="1">
+              <a:rPr lang="en-GB" sz="1400" dirty="0" err="1">
                 <a:latin typeface="Courier New" panose="02070309020205020404" pitchFamily="49" charset="0"/>
                 <a:cs typeface="Courier New" panose="02070309020205020404" pitchFamily="49" charset="0"/>
               </a:rPr>
               <a:t>entered_age</a:t>
             </a:r>
             <a:r>
-              <a:rPr lang="en-GB" sz="1200" dirty="0">
+              <a:rPr lang="en-GB" sz="1400" dirty="0">
                 <a:latin typeface="Courier New" panose="02070309020205020404" pitchFamily="49" charset="0"/>
                 <a:cs typeface="Courier New" panose="02070309020205020404" pitchFamily="49" charset="0"/>
               </a:rPr>
               <a:t> = </a:t>
             </a:r>
             <a:r>
-              <a:rPr lang="en-GB" sz="1200" dirty="0" err="1">
+              <a:rPr lang="en-GB" sz="1400" dirty="0" err="1">
                 <a:latin typeface="Courier New" panose="02070309020205020404" pitchFamily="49" charset="0"/>
                 <a:cs typeface="Courier New" panose="02070309020205020404" pitchFamily="49" charset="0"/>
               </a:rPr>
               <a:t>ask_for_age</a:t>
             </a:r>
             <a:r>
-              <a:rPr lang="en-GB" sz="1200" dirty="0">
+              <a:rPr lang="en-GB" sz="1400" dirty="0">
                 <a:latin typeface="Courier New" panose="02070309020205020404" pitchFamily="49" charset="0"/>
                 <a:cs typeface="Courier New" panose="02070309020205020404" pitchFamily="49" charset="0"/>
               </a:rPr>
@@ -5907,7 +5907,7 @@
           </a:p>
           <a:p>
             <a:r>
-              <a:rPr lang="en-GB" sz="1200" dirty="0">
+              <a:rPr lang="en-GB" sz="1400" dirty="0">
                 <a:solidFill>
                   <a:srgbClr val="00B050"/>
                 </a:solidFill>
@@ -5919,35 +5919,35 @@
           </a:p>
           <a:p>
             <a:r>
-              <a:rPr lang="en-GB" sz="1200" dirty="0">
+              <a:rPr lang="en-GB" sz="1400" dirty="0">
                 <a:latin typeface="Courier New" panose="02070309020205020404" pitchFamily="49" charset="0"/>
                 <a:cs typeface="Courier New" panose="02070309020205020404" pitchFamily="49" charset="0"/>
               </a:rPr>
               <a:t>participant = Participant(</a:t>
             </a:r>
             <a:r>
-              <a:rPr lang="en-GB" sz="1200" dirty="0" err="1">
+              <a:rPr lang="en-GB" sz="1400" dirty="0" err="1">
                 <a:latin typeface="Courier New" panose="02070309020205020404" pitchFamily="49" charset="0"/>
                 <a:cs typeface="Courier New" panose="02070309020205020404" pitchFamily="49" charset="0"/>
               </a:rPr>
               <a:t>entered_name</a:t>
             </a:r>
             <a:r>
-              <a:rPr lang="en-GB" sz="1200" dirty="0">
+              <a:rPr lang="en-GB" sz="1400" dirty="0">
                 <a:latin typeface="Courier New" panose="02070309020205020404" pitchFamily="49" charset="0"/>
                 <a:cs typeface="Courier New" panose="02070309020205020404" pitchFamily="49" charset="0"/>
               </a:rPr>
               <a:t>, </a:t>
             </a:r>
             <a:r>
-              <a:rPr lang="en-GB" sz="1200" dirty="0" err="1">
+              <a:rPr lang="en-GB" sz="1400" dirty="0" err="1">
                 <a:latin typeface="Courier New" panose="02070309020205020404" pitchFamily="49" charset="0"/>
                 <a:cs typeface="Courier New" panose="02070309020205020404" pitchFamily="49" charset="0"/>
               </a:rPr>
               <a:t>entered_age</a:t>
             </a:r>
             <a:r>
-              <a:rPr lang="en-GB" sz="1200" dirty="0">
+              <a:rPr lang="en-GB" sz="1400" dirty="0">
                 <a:latin typeface="Courier New" panose="02070309020205020404" pitchFamily="49" charset="0"/>
                 <a:cs typeface="Courier New" panose="02070309020205020404" pitchFamily="49" charset="0"/>
               </a:rPr>
@@ -5955,14 +5955,14 @@
             </a:r>
           </a:p>
           <a:p>
-            <a:endParaRPr lang="en-GB" sz="1200" dirty="0">
+            <a:endParaRPr lang="en-GB" sz="1400" dirty="0">
               <a:latin typeface="Courier New" panose="02070309020205020404" pitchFamily="49" charset="0"/>
               <a:cs typeface="Courier New" panose="02070309020205020404" pitchFamily="49" charset="0"/>
             </a:endParaRPr>
           </a:p>
           <a:p>
             <a:r>
-              <a:rPr lang="en-GB" sz="1200" dirty="0">
+              <a:rPr lang="en-GB" sz="1400" dirty="0">
                 <a:solidFill>
                   <a:srgbClr val="00B050"/>
                 </a:solidFill>
@@ -5974,14 +5974,14 @@
           </a:p>
           <a:p>
             <a:r>
-              <a:rPr lang="en-GB" sz="1200" dirty="0">
+              <a:rPr lang="en-GB" sz="1400" dirty="0">
                 <a:latin typeface="Courier New" panose="02070309020205020404" pitchFamily="49" charset="0"/>
                 <a:cs typeface="Courier New" panose="02070309020205020404" pitchFamily="49" charset="0"/>
               </a:rPr>
               <a:t>s1 = Stimulus(1, </a:t>
             </a:r>
             <a:r>
-              <a:rPr lang="en-GB" sz="1200" dirty="0">
+              <a:rPr lang="en-GB" sz="1400" dirty="0">
                 <a:solidFill>
                   <a:schemeClr val="accent6">
                     <a:lumMod val="75000"/>
@@ -5993,7 +5993,7 @@
               <a:t>'cube'</a:t>
             </a:r>
             <a:r>
-              <a:rPr lang="en-GB" sz="1200" dirty="0">
+              <a:rPr lang="en-GB" sz="1400" dirty="0">
                 <a:latin typeface="Courier New" panose="02070309020205020404" pitchFamily="49" charset="0"/>
                 <a:cs typeface="Courier New" panose="02070309020205020404" pitchFamily="49" charset="0"/>
               </a:rPr>
@@ -6002,14 +6002,14 @@
           </a:p>
           <a:p>
             <a:r>
-              <a:rPr lang="en-GB" sz="1200" dirty="0">
+              <a:rPr lang="en-GB" sz="1400" dirty="0">
                 <a:latin typeface="Courier New" panose="02070309020205020404" pitchFamily="49" charset="0"/>
                 <a:cs typeface="Courier New" panose="02070309020205020404" pitchFamily="49" charset="0"/>
               </a:rPr>
               <a:t>s2 = Stimulus(2, </a:t>
             </a:r>
             <a:r>
-              <a:rPr lang="en-GB" sz="1200" dirty="0">
+              <a:rPr lang="en-GB" sz="1400" dirty="0">
                 <a:solidFill>
                   <a:schemeClr val="accent6">
                     <a:lumMod val="75000"/>
@@ -6021,7 +6021,7 @@
               <a:t>'cube'</a:t>
             </a:r>
             <a:r>
-              <a:rPr lang="en-GB" sz="1200" dirty="0">
+              <a:rPr lang="en-GB" sz="1400" dirty="0">
                 <a:latin typeface="Courier New" panose="02070309020205020404" pitchFamily="49" charset="0"/>
                 <a:cs typeface="Courier New" panose="02070309020205020404" pitchFamily="49" charset="0"/>
               </a:rPr>
@@ -6030,14 +6030,14 @@
           </a:p>
           <a:p>
             <a:r>
-              <a:rPr lang="en-GB" sz="1200" dirty="0">
+              <a:rPr lang="en-GB" sz="1400" dirty="0">
                 <a:latin typeface="Courier New" panose="02070309020205020404" pitchFamily="49" charset="0"/>
                 <a:cs typeface="Courier New" panose="02070309020205020404" pitchFamily="49" charset="0"/>
               </a:rPr>
               <a:t>s3 = Stimulus(3, </a:t>
             </a:r>
             <a:r>
-              <a:rPr lang="en-GB" sz="1200" dirty="0">
+              <a:rPr lang="en-GB" sz="1400" dirty="0">
                 <a:solidFill>
                   <a:schemeClr val="accent6">
                     <a:lumMod val="75000"/>
@@ -6049,7 +6049,7 @@
               <a:t>'cube'</a:t>
             </a:r>
             <a:r>
-              <a:rPr lang="en-GB" sz="1200" dirty="0">
+              <a:rPr lang="en-GB" sz="1400" dirty="0">
                 <a:latin typeface="Courier New" panose="02070309020205020404" pitchFamily="49" charset="0"/>
                 <a:cs typeface="Courier New" panose="02070309020205020404" pitchFamily="49" charset="0"/>
               </a:rPr>
@@ -6058,14 +6058,14 @@
           </a:p>
           <a:p>
             <a:r>
-              <a:rPr lang="en-GB" sz="1200" dirty="0">
+              <a:rPr lang="en-GB" sz="1400" dirty="0">
                 <a:latin typeface="Courier New" panose="02070309020205020404" pitchFamily="49" charset="0"/>
                 <a:cs typeface="Courier New" panose="02070309020205020404" pitchFamily="49" charset="0"/>
               </a:rPr>
               <a:t>s4 = Stimulus(4, </a:t>
             </a:r>
             <a:r>
-              <a:rPr lang="en-GB" sz="1200" dirty="0">
+              <a:rPr lang="en-GB" sz="1400" dirty="0">
                 <a:solidFill>
                   <a:schemeClr val="accent6">
                     <a:lumMod val="75000"/>
@@ -6077,7 +6077,7 @@
               <a:t>'sphere'</a:t>
             </a:r>
             <a:r>
-              <a:rPr lang="en-GB" sz="1200" dirty="0">
+              <a:rPr lang="en-GB" sz="1400" dirty="0">
                 <a:latin typeface="Courier New" panose="02070309020205020404" pitchFamily="49" charset="0"/>
                 <a:cs typeface="Courier New" panose="02070309020205020404" pitchFamily="49" charset="0"/>
               </a:rPr>
@@ -6086,14 +6086,14 @@
           </a:p>
           <a:p>
             <a:r>
-              <a:rPr lang="en-GB" sz="1200" dirty="0">
+              <a:rPr lang="en-GB" sz="1400" dirty="0">
                 <a:latin typeface="Courier New" panose="02070309020205020404" pitchFamily="49" charset="0"/>
                 <a:cs typeface="Courier New" panose="02070309020205020404" pitchFamily="49" charset="0"/>
               </a:rPr>
               <a:t>s5 = Stimulus(5, </a:t>
             </a:r>
             <a:r>
-              <a:rPr lang="en-GB" sz="1200" dirty="0">
+              <a:rPr lang="en-GB" sz="1400" dirty="0">
                 <a:solidFill>
                   <a:schemeClr val="accent6">
                     <a:lumMod val="75000"/>
@@ -6105,7 +6105,7 @@
               <a:t>'sphere'</a:t>
             </a:r>
             <a:r>
-              <a:rPr lang="en-GB" sz="1200" dirty="0">
+              <a:rPr lang="en-GB" sz="1400" dirty="0">
                 <a:latin typeface="Courier New" panose="02070309020205020404" pitchFamily="49" charset="0"/>
                 <a:cs typeface="Courier New" panose="02070309020205020404" pitchFamily="49" charset="0"/>
               </a:rPr>
@@ -6114,14 +6114,14 @@
           </a:p>
           <a:p>
             <a:r>
-              <a:rPr lang="en-GB" sz="1200" dirty="0">
+              <a:rPr lang="en-GB" sz="1400" dirty="0">
                 <a:latin typeface="Courier New" panose="02070309020205020404" pitchFamily="49" charset="0"/>
                 <a:cs typeface="Courier New" panose="02070309020205020404" pitchFamily="49" charset="0"/>
               </a:rPr>
               <a:t>s6 = Stimulus(6, </a:t>
             </a:r>
             <a:r>
-              <a:rPr lang="en-GB" sz="1200" dirty="0">
+              <a:rPr lang="en-GB" sz="1400" dirty="0">
                 <a:solidFill>
                   <a:schemeClr val="accent6">
                     <a:lumMod val="75000"/>
@@ -6133,7 +6133,7 @@
               <a:t>'sphere'</a:t>
             </a:r>
             <a:r>
-              <a:rPr lang="en-GB" sz="1200" dirty="0">
+              <a:rPr lang="en-GB" sz="1400" dirty="0">
                 <a:latin typeface="Courier New" panose="02070309020205020404" pitchFamily="49" charset="0"/>
                 <a:cs typeface="Courier New" panose="02070309020205020404" pitchFamily="49" charset="0"/>
               </a:rPr>
@@ -6142,7 +6142,7 @@
           </a:p>
           <a:p>
             <a:r>
-              <a:rPr lang="en-GB" sz="1200" dirty="0">
+              <a:rPr lang="en-GB" sz="1400" dirty="0">
                 <a:latin typeface="Courier New" panose="02070309020205020404" pitchFamily="49" charset="0"/>
                 <a:cs typeface="Courier New" panose="02070309020205020404" pitchFamily="49" charset="0"/>
               </a:rPr>
@@ -6151,14 +6151,14 @@
           </a:p>
           <a:p>
             <a:r>
-              <a:rPr lang="en-GB" sz="1200" dirty="0" err="1">
+              <a:rPr lang="en-GB" sz="1400" dirty="0" err="1">
                 <a:latin typeface="Courier New" panose="02070309020205020404" pitchFamily="49" charset="0"/>
                 <a:cs typeface="Courier New" panose="02070309020205020404" pitchFamily="49" charset="0"/>
               </a:rPr>
               <a:t>random.shuffle</a:t>
             </a:r>
             <a:r>
-              <a:rPr lang="en-GB" sz="1200" dirty="0">
+              <a:rPr lang="en-GB" sz="1400" dirty="0">
                 <a:latin typeface="Courier New" panose="02070309020205020404" pitchFamily="49" charset="0"/>
                 <a:cs typeface="Courier New" panose="02070309020205020404" pitchFamily="49" charset="0"/>
               </a:rPr>
@@ -6166,14 +6166,14 @@
             </a:r>
           </a:p>
           <a:p>
-            <a:endParaRPr lang="en-GB" sz="1200" dirty="0">
+            <a:endParaRPr lang="en-GB" sz="1400" dirty="0">
               <a:latin typeface="Courier New" panose="02070309020205020404" pitchFamily="49" charset="0"/>
               <a:cs typeface="Courier New" panose="02070309020205020404" pitchFamily="49" charset="0"/>
             </a:endParaRPr>
           </a:p>
           <a:p>
             <a:r>
-              <a:rPr lang="en-GB" sz="1200" dirty="0">
+              <a:rPr lang="en-GB" sz="1400" dirty="0">
                 <a:solidFill>
                   <a:srgbClr val="00B050"/>
                 </a:solidFill>
@@ -6185,21 +6185,21 @@
           </a:p>
           <a:p>
             <a:r>
-              <a:rPr lang="en-GB" sz="1200" dirty="0">
+              <a:rPr lang="en-GB" sz="1400" dirty="0">
                 <a:latin typeface="Courier New" panose="02070309020205020404" pitchFamily="49" charset="0"/>
                 <a:cs typeface="Courier New" panose="02070309020205020404" pitchFamily="49" charset="0"/>
               </a:rPr>
               <a:t>questions = </a:t>
             </a:r>
             <a:r>
-              <a:rPr lang="en-GB" sz="1200" dirty="0" err="1">
+              <a:rPr lang="en-GB" sz="1400" dirty="0" err="1">
                 <a:latin typeface="Courier New" panose="02070309020205020404" pitchFamily="49" charset="0"/>
                 <a:cs typeface="Courier New" panose="02070309020205020404" pitchFamily="49" charset="0"/>
               </a:rPr>
               <a:t>create_questions_from_stimuli</a:t>
             </a:r>
             <a:r>
-              <a:rPr lang="en-GB" sz="1200" dirty="0">
+              <a:rPr lang="en-GB" sz="1400" dirty="0">
                 <a:latin typeface="Courier New" panose="02070309020205020404" pitchFamily="49" charset="0"/>
                 <a:cs typeface="Courier New" panose="02070309020205020404" pitchFamily="49" charset="0"/>
               </a:rPr>
@@ -6208,14 +6208,14 @@
           </a:p>
           <a:p>
             <a:r>
-              <a:rPr lang="en-GB" sz="1200" dirty="0" err="1">
+              <a:rPr lang="en-GB" sz="1400" dirty="0" err="1">
                 <a:latin typeface="Courier New" panose="02070309020205020404" pitchFamily="49" charset="0"/>
                 <a:cs typeface="Courier New" panose="02070309020205020404" pitchFamily="49" charset="0"/>
               </a:rPr>
               <a:t>random.shuffle</a:t>
             </a:r>
             <a:r>
-              <a:rPr lang="en-GB" sz="1200" dirty="0">
+              <a:rPr lang="en-GB" sz="1400" dirty="0">
                 <a:latin typeface="Courier New" panose="02070309020205020404" pitchFamily="49" charset="0"/>
                 <a:cs typeface="Courier New" panose="02070309020205020404" pitchFamily="49" charset="0"/>
               </a:rPr>
@@ -6223,14 +6223,14 @@
             </a:r>
           </a:p>
           <a:p>
-            <a:endParaRPr lang="en-GB" sz="1200" dirty="0">
+            <a:endParaRPr lang="en-GB" sz="1400" dirty="0">
               <a:latin typeface="Courier New" panose="02070309020205020404" pitchFamily="49" charset="0"/>
               <a:cs typeface="Courier New" panose="02070309020205020404" pitchFamily="49" charset="0"/>
             </a:endParaRPr>
           </a:p>
           <a:p>
             <a:r>
-              <a:rPr lang="en-GB" sz="1200" dirty="0">
+              <a:rPr lang="en-GB" sz="1400" dirty="0">
                 <a:solidFill>
                   <a:srgbClr val="00B050"/>
                 </a:solidFill>
@@ -6242,21 +6242,21 @@
           </a:p>
           <a:p>
             <a:r>
-              <a:rPr lang="en-GB" sz="1200" dirty="0">
+              <a:rPr lang="en-GB" sz="1400" dirty="0">
                 <a:latin typeface="Courier New" panose="02070309020205020404" pitchFamily="49" charset="0"/>
                 <a:cs typeface="Courier New" panose="02070309020205020404" pitchFamily="49" charset="0"/>
               </a:rPr>
               <a:t>trials = </a:t>
             </a:r>
             <a:r>
-              <a:rPr lang="en-GB" sz="1200" dirty="0" err="1">
+              <a:rPr lang="en-GB" sz="1400" dirty="0" err="1">
                 <a:latin typeface="Courier New" panose="02070309020205020404" pitchFamily="49" charset="0"/>
                 <a:cs typeface="Courier New" panose="02070309020205020404" pitchFamily="49" charset="0"/>
               </a:rPr>
               <a:t>create_trials_from_questions</a:t>
             </a:r>
             <a:r>
-              <a:rPr lang="en-GB" sz="1200" dirty="0">
+              <a:rPr lang="en-GB" sz="1400" dirty="0">
                 <a:latin typeface="Courier New" panose="02070309020205020404" pitchFamily="49" charset="0"/>
                 <a:cs typeface="Courier New" panose="02070309020205020404" pitchFamily="49" charset="0"/>
               </a:rPr>
@@ -9037,8 +9037,8 @@
         </p:nvCxnSpPr>
         <p:spPr>
           <a:xfrm flipV="1">
-            <a:off x="4162697" y="3805651"/>
-            <a:ext cx="2232703" cy="539926"/>
+            <a:off x="4870764" y="3805651"/>
+            <a:ext cx="1524636" cy="1037953"/>
           </a:xfrm>
           <a:prstGeom prst="straightConnector1">
             <a:avLst/>
@@ -9070,8 +9070,8 @@
         </p:nvCxnSpPr>
         <p:spPr>
           <a:xfrm>
-            <a:off x="3849189" y="5259977"/>
-            <a:ext cx="2546211" cy="463420"/>
+            <a:off x="3150606" y="5977522"/>
+            <a:ext cx="2384715" cy="490579"/>
           </a:xfrm>
           <a:prstGeom prst="straightConnector1">
             <a:avLst/>
@@ -9103,8 +9103,8 @@
         </p:nvSpPr>
         <p:spPr>
           <a:xfrm>
-            <a:off x="6395401" y="5465095"/>
-            <a:ext cx="2520000" cy="1077218"/>
+            <a:off x="5535321" y="5977522"/>
+            <a:ext cx="3092631" cy="830997"/>
           </a:xfrm>
           <a:prstGeom prst="rect">
             <a:avLst/>
@@ -9305,7 +9305,7 @@
         </p:nvSpPr>
         <p:spPr>
           <a:xfrm>
-            <a:off x="1914799" y="2800628"/>
+            <a:off x="1914799" y="2239313"/>
             <a:ext cx="5085802" cy="2062103"/>
           </a:xfrm>
           <a:prstGeom prst="rect">
@@ -9427,6 +9427,35 @@
               <a:latin typeface="Courier New" panose="02070309020205020404" pitchFamily="49" charset="0"/>
               <a:cs typeface="Courier New" panose="02070309020205020404" pitchFamily="49" charset="0"/>
             </a:endParaRPr>
+          </a:p>
+        </p:txBody>
+      </p:sp>
+      <p:sp>
+        <p:nvSpPr>
+          <p:cNvPr id="2" name="TextBox 1"/>
+          <p:cNvSpPr txBox="1"/>
+          <p:nvPr/>
+        </p:nvSpPr>
+        <p:spPr>
+          <a:xfrm>
+            <a:off x="2510434" y="5350597"/>
+            <a:ext cx="3486660" cy="584775"/>
+          </a:xfrm>
+          <a:prstGeom prst="rect">
+            <a:avLst/>
+          </a:prstGeom>
+          <a:noFill/>
+        </p:spPr>
+        <p:txBody>
+          <a:bodyPr wrap="none" rtlCol="0">
+            <a:spAutoFit/>
+          </a:bodyPr>
+          <a:lstStyle/>
+          <a:p>
+            <a:r>
+              <a:rPr lang="en-GB" sz="3200" dirty="0"/>
+              <a:t>Very easy to read!</a:t>
+            </a:r>
           </a:p>
         </p:txBody>
       </p:sp>

</xml_diff>